<commit_message>
- Fixed errors in alpha-beta pruning animation
Signed-off-by: Burnside <jonathan.burnside@gmail.com>
</commit_message>
<xml_diff>
--- a/Lecture Slides/NeuralNetworks.pptx
+++ b/Lecture Slides/NeuralNetworks.pptx
@@ -217,7 +217,7 @@
           <a:p>
             <a:fld id="{BE1546E9-2860-4B49-8F9F-86BAC8B7C23B}" type="datetimeFigureOut">
               <a:rPr lang="en-US" smtClean="0"/>
-              <a:t>10/19/2016</a:t>
+              <a:t>10/20/2016</a:t>
             </a:fld>
             <a:endParaRPr lang="en-US"/>
           </a:p>
@@ -873,7 +873,7 @@
           <a:p>
             <a:fld id="{F2984FE6-EA9C-42A0-A3D5-84696E6A6B72}" type="datetimeFigureOut">
               <a:rPr lang="en-US" smtClean="0"/>
-              <a:t>10/19/2016</a:t>
+              <a:t>10/20/2016</a:t>
             </a:fld>
             <a:endParaRPr lang="en-US"/>
           </a:p>
@@ -1084,7 +1084,7 @@
           <a:p>
             <a:fld id="{F2984FE6-EA9C-42A0-A3D5-84696E6A6B72}" type="datetimeFigureOut">
               <a:rPr lang="en-US" smtClean="0"/>
-              <a:t>10/19/2016</a:t>
+              <a:t>10/20/2016</a:t>
             </a:fld>
             <a:endParaRPr lang="en-US"/>
           </a:p>
@@ -1299,7 +1299,7 @@
           <a:p>
             <a:fld id="{F2984FE6-EA9C-42A0-A3D5-84696E6A6B72}" type="datetimeFigureOut">
               <a:rPr lang="en-US" smtClean="0"/>
-              <a:t>10/19/2016</a:t>
+              <a:t>10/20/2016</a:t>
             </a:fld>
             <a:endParaRPr lang="en-US"/>
           </a:p>
@@ -1500,7 +1500,7 @@
           <a:p>
             <a:fld id="{F2984FE6-EA9C-42A0-A3D5-84696E6A6B72}" type="datetimeFigureOut">
               <a:rPr lang="en-US" smtClean="0"/>
-              <a:t>10/19/2016</a:t>
+              <a:t>10/20/2016</a:t>
             </a:fld>
             <a:endParaRPr lang="en-US"/>
           </a:p>
@@ -1779,7 +1779,7 @@
           <a:p>
             <a:fld id="{F2984FE6-EA9C-42A0-A3D5-84696E6A6B72}" type="datetimeFigureOut">
               <a:rPr lang="en-US" smtClean="0"/>
-              <a:t>10/19/2016</a:t>
+              <a:t>10/20/2016</a:t>
             </a:fld>
             <a:endParaRPr lang="en-US"/>
           </a:p>
@@ -2047,7 +2047,7 @@
           <a:p>
             <a:fld id="{F2984FE6-EA9C-42A0-A3D5-84696E6A6B72}" type="datetimeFigureOut">
               <a:rPr lang="en-US" smtClean="0"/>
-              <a:t>10/19/2016</a:t>
+              <a:t>10/20/2016</a:t>
             </a:fld>
             <a:endParaRPr lang="en-US"/>
           </a:p>
@@ -2463,7 +2463,7 @@
           <a:p>
             <a:fld id="{F2984FE6-EA9C-42A0-A3D5-84696E6A6B72}" type="datetimeFigureOut">
               <a:rPr lang="en-US" smtClean="0"/>
-              <a:t>10/19/2016</a:t>
+              <a:t>10/20/2016</a:t>
             </a:fld>
             <a:endParaRPr lang="en-US"/>
           </a:p>
@@ -2612,7 +2612,7 @@
           <a:p>
             <a:fld id="{F2984FE6-EA9C-42A0-A3D5-84696E6A6B72}" type="datetimeFigureOut">
               <a:rPr lang="en-US" smtClean="0"/>
-              <a:t>10/19/2016</a:t>
+              <a:t>10/20/2016</a:t>
             </a:fld>
             <a:endParaRPr lang="en-US"/>
           </a:p>
@@ -2738,7 +2738,7 @@
           <a:p>
             <a:fld id="{F2984FE6-EA9C-42A0-A3D5-84696E6A6B72}" type="datetimeFigureOut">
               <a:rPr lang="en-US" smtClean="0"/>
-              <a:t>10/19/2016</a:t>
+              <a:t>10/20/2016</a:t>
             </a:fld>
             <a:endParaRPr lang="en-US"/>
           </a:p>
@@ -2989,7 +2989,7 @@
           <a:p>
             <a:fld id="{F2984FE6-EA9C-42A0-A3D5-84696E6A6B72}" type="datetimeFigureOut">
               <a:rPr lang="en-US" smtClean="0"/>
-              <a:t>10/19/2016</a:t>
+              <a:t>10/20/2016</a:t>
             </a:fld>
             <a:endParaRPr lang="en-US"/>
           </a:p>
@@ -3434,7 +3434,7 @@
           <a:p>
             <a:fld id="{F2984FE6-EA9C-42A0-A3D5-84696E6A6B72}" type="datetimeFigureOut">
               <a:rPr lang="en-US" smtClean="0"/>
-              <a:t>10/19/2016</a:t>
+              <a:t>10/20/2016</a:t>
             </a:fld>
             <a:endParaRPr lang="en-US"/>
           </a:p>
@@ -3760,7 +3760,7 @@
           <a:p>
             <a:fld id="{F2984FE6-EA9C-42A0-A3D5-84696E6A6B72}" type="datetimeFigureOut">
               <a:rPr lang="en-US" smtClean="0"/>
-              <a:t>10/19/2016</a:t>
+              <a:t>10/20/2016</a:t>
             </a:fld>
             <a:endParaRPr lang="en-US"/>
           </a:p>
@@ -4618,7 +4618,7 @@
                       <a:schemeClr val="accent2"/>
                     </a:solidFill>
                   </a:rPr>
-                  <a:t>Back Propagation.</a:t>
+                  <a:t>Backpropagation.</a:t>
                 </a:r>
               </a:p>
               <a:p>
@@ -4651,7 +4651,7 @@
               <a:p>
                 <a:r>
                   <a:rPr lang="en-US" dirty="0"/>
-                  <a:t>The back propagation technique will give us these partial derivatives.</a:t>
+                  <a:t>The backpropagation technique will give us these partial derivatives.</a:t>
                 </a:r>
               </a:p>
             </p:txBody>
@@ -7165,8 +7165,8 @@
           </a:p>
         </p:txBody>
       </p:sp>
-      <mc:AlternateContent xmlns:mc="http://schemas.openxmlformats.org/markup-compatibility/2006" xmlns:a14="http://schemas.microsoft.com/office/drawing/2010/main">
-        <mc:Choice Requires="a14">
+      <mc:AlternateContent xmlns:mc="http://schemas.openxmlformats.org/markup-compatibility/2006">
+        <mc:Choice xmlns:a14="http://schemas.microsoft.com/office/drawing/2010/main" Requires="a14">
           <p:sp>
             <p:nvSpPr>
               <p:cNvPr id="3" name="Content Placeholder 2"/>
@@ -7192,11 +7192,11 @@
                       <a:schemeClr val="accent2"/>
                     </a:solidFill>
                   </a:rPr>
-                  <a:t>activation,</a:t>
+                  <a:t>activation value,</a:t>
                 </a:r>
                 <a:r>
                   <a:rPr lang="en-US" dirty="0"/>
-                  <a:t>  of each node in our network as:</a:t>
+                  <a:t> of each node in our network as:</a:t>
                 </a:r>
               </a:p>
               <a:p>
@@ -7579,7 +7579,7 @@
             </p:txBody>
           </p:sp>
         </mc:Choice>
-        <mc:Fallback xmlns="">
+        <mc:Fallback>
           <p:sp>
             <p:nvSpPr>
               <p:cNvPr id="3" name="Content Placeholder 2"/>

</xml_diff>